<commit_message>
Machine Learning and Matplotlib
</commit_message>
<xml_diff>
--- a/Final presentation/DATA CONSULTING.pptx
+++ b/Final presentation/DATA CONSULTING.pptx
@@ -118,6 +118,11 @@
       </a:defRPr>
     </a:lvl9pPr>
   </p:defaultTextStyle>
+  <p:extLst>
+    <p:ext uri="{EFAFB233-063F-42B5-8137-9DF3F51BA10A}">
+      <p15:sldGuideLst xmlns:p15="http://schemas.microsoft.com/office/powerpoint/2012/main"/>
+    </p:ext>
+  </p:extLst>
 </p:presentation>
 </file>
 
@@ -38106,8 +38111,8 @@
         </p:nvSpPr>
         <p:spPr>
           <a:xfrm>
-            <a:off x="314737" y="527635"/>
-            <a:ext cx="3582000" cy="770400"/>
+            <a:off x="219340" y="351172"/>
+            <a:ext cx="7000464" cy="770400"/>
           </a:xfrm>
           <a:prstGeom prst="rect">
             <a:avLst/>
@@ -38377,7 +38382,252 @@
               <a:rPr lang="es-MX" sz="3200" kern="0" dirty="0" err="1"/>
               <a:t>Learning</a:t>
             </a:r>
+            <a:r>
+              <a:rPr lang="es-MX" sz="3200" kern="0" dirty="0"/>
+              <a:t> and </a:t>
+            </a:r>
+            <a:r>
+              <a:rPr lang="es-MX" sz="3200" kern="0" dirty="0" err="1"/>
+              <a:t>Maplotlib</a:t>
+            </a:r>
             <a:endParaRPr lang="es-MX" sz="3200" kern="0" dirty="0"/>
+          </a:p>
+        </p:txBody>
+      </p:sp>
+      <p:pic>
+        <p:nvPicPr>
+          <p:cNvPr id="4" name="Imagen 3">
+            <a:extLst>
+              <a:ext uri="{FF2B5EF4-FFF2-40B4-BE49-F238E27FC236}">
+                <a16:creationId xmlns:a16="http://schemas.microsoft.com/office/drawing/2014/main" id="{1CB7344C-F6CE-2FF5-6AA5-4005BF704382}"/>
+              </a:ext>
+            </a:extLst>
+          </p:cNvPr>
+          <p:cNvPicPr>
+            <a:picLocks noChangeAspect="1"/>
+          </p:cNvPicPr>
+          <p:nvPr/>
+        </p:nvPicPr>
+        <p:blipFill>
+          <a:blip r:embed="rId2"/>
+          <a:stretch>
+            <a:fillRect/>
+          </a:stretch>
+        </p:blipFill>
+        <p:spPr>
+          <a:xfrm>
+            <a:off x="328360" y="2534417"/>
+            <a:ext cx="5587404" cy="2912440"/>
+          </a:xfrm>
+          <a:prstGeom prst="rect">
+            <a:avLst/>
+          </a:prstGeom>
+        </p:spPr>
+      </p:pic>
+      <p:sp>
+        <p:nvSpPr>
+          <p:cNvPr id="5" name="CuadroTexto 4">
+            <a:extLst>
+              <a:ext uri="{FF2B5EF4-FFF2-40B4-BE49-F238E27FC236}">
+                <a16:creationId xmlns:a16="http://schemas.microsoft.com/office/drawing/2014/main" id="{0CC66840-20FC-45C4-DDB7-399060DB4C7B}"/>
+              </a:ext>
+            </a:extLst>
+          </p:cNvPr>
+          <p:cNvSpPr txBox="1"/>
+          <p:nvPr/>
+        </p:nvSpPr>
+        <p:spPr>
+          <a:xfrm>
+            <a:off x="344906" y="1876056"/>
+            <a:ext cx="3518912" cy="369332"/>
+          </a:xfrm>
+          <a:prstGeom prst="rect">
+            <a:avLst/>
+          </a:prstGeom>
+          <a:noFill/>
+        </p:spPr>
+        <p:txBody>
+          <a:bodyPr wrap="none" rtlCol="0">
+            <a:spAutoFit/>
+          </a:bodyPr>
+          <a:lstStyle/>
+          <a:p>
+            <a:r>
+              <a:rPr lang="es-MX" dirty="0">
+                <a:solidFill>
+                  <a:schemeClr val="bg1"/>
+                </a:solidFill>
+              </a:rPr>
+              <a:t>Simple Linear </a:t>
+            </a:r>
+            <a:r>
+              <a:rPr lang="es-MX" dirty="0" err="1">
+                <a:solidFill>
+                  <a:schemeClr val="bg1"/>
+                </a:solidFill>
+              </a:rPr>
+              <a:t>Regression</a:t>
+            </a:r>
+            <a:r>
+              <a:rPr lang="es-MX" dirty="0">
+                <a:solidFill>
+                  <a:schemeClr val="bg1"/>
+                </a:solidFill>
+              </a:rPr>
+              <a:t> </a:t>
+            </a:r>
+            <a:r>
+              <a:rPr lang="es-MX" dirty="0" err="1">
+                <a:solidFill>
+                  <a:schemeClr val="bg1"/>
+                </a:solidFill>
+              </a:rPr>
+              <a:t>Model</a:t>
+            </a:r>
+            <a:endParaRPr lang="es-MX" dirty="0">
+              <a:solidFill>
+                <a:schemeClr val="bg1"/>
+              </a:solidFill>
+            </a:endParaRPr>
+          </a:p>
+        </p:txBody>
+      </p:sp>
+      <p:pic>
+        <p:nvPicPr>
+          <p:cNvPr id="1026" name="Picture 2">
+            <a:extLst>
+              <a:ext uri="{FF2B5EF4-FFF2-40B4-BE49-F238E27FC236}">
+                <a16:creationId xmlns:a16="http://schemas.microsoft.com/office/drawing/2014/main" id="{B6094613-D689-C395-A542-EE75735C9BA8}"/>
+              </a:ext>
+            </a:extLst>
+          </p:cNvPr>
+          <p:cNvPicPr>
+            <a:picLocks noChangeAspect="1" noChangeArrowheads="1"/>
+          </p:cNvPicPr>
+          <p:nvPr/>
+        </p:nvPicPr>
+        <p:blipFill>
+          <a:blip r:embed="rId3">
+            <a:extLst>
+              <a:ext uri="{28A0092B-C50C-407E-A947-70E740481C1C}">
+                <a14:useLocalDpi xmlns:a14="http://schemas.microsoft.com/office/drawing/2010/main" val="0"/>
+              </a:ext>
+            </a:extLst>
+          </a:blip>
+          <a:srcRect/>
+          <a:stretch>
+            <a:fillRect/>
+          </a:stretch>
+        </p:blipFill>
+        <p:spPr bwMode="auto">
+          <a:xfrm>
+            <a:off x="6188003" y="2518656"/>
+            <a:ext cx="5587405" cy="2943961"/>
+          </a:xfrm>
+          <a:prstGeom prst="rect">
+            <a:avLst/>
+          </a:prstGeom>
+          <a:noFill/>
+          <a:extLst>
+            <a:ext uri="{909E8E84-426E-40DD-AFC4-6F175D3DCCD1}">
+              <a14:hiddenFill xmlns:a14="http://schemas.microsoft.com/office/drawing/2010/main">
+                <a:solidFill>
+                  <a:srgbClr val="FFFFFF"/>
+                </a:solidFill>
+              </a14:hiddenFill>
+            </a:ext>
+          </a:extLst>
+        </p:spPr>
+      </p:pic>
+      <p:sp>
+        <p:nvSpPr>
+          <p:cNvPr id="6" name="CuadroTexto 5">
+            <a:extLst>
+              <a:ext uri="{FF2B5EF4-FFF2-40B4-BE49-F238E27FC236}">
+                <a16:creationId xmlns:a16="http://schemas.microsoft.com/office/drawing/2014/main" id="{74285B2B-5FB7-F2B9-25C1-24F588DE9F7C}"/>
+              </a:ext>
+            </a:extLst>
+          </p:cNvPr>
+          <p:cNvSpPr txBox="1"/>
+          <p:nvPr/>
+        </p:nvSpPr>
+        <p:spPr>
+          <a:xfrm>
+            <a:off x="6117734" y="1876056"/>
+            <a:ext cx="5262979" cy="369332"/>
+          </a:xfrm>
+          <a:prstGeom prst="rect">
+            <a:avLst/>
+          </a:prstGeom>
+          <a:noFill/>
+        </p:spPr>
+        <p:txBody>
+          <a:bodyPr wrap="none" rtlCol="0">
+            <a:spAutoFit/>
+          </a:bodyPr>
+          <a:lstStyle/>
+          <a:p>
+            <a:r>
+              <a:rPr lang="es-MX" dirty="0" err="1">
+                <a:solidFill>
+                  <a:schemeClr val="bg1"/>
+                </a:solidFill>
+              </a:rPr>
+              <a:t>Predicted</a:t>
+            </a:r>
+            <a:r>
+              <a:rPr lang="es-MX" dirty="0">
+                <a:solidFill>
+                  <a:schemeClr val="bg1"/>
+                </a:solidFill>
+              </a:rPr>
+              <a:t> sales </a:t>
+            </a:r>
+            <a:r>
+              <a:rPr lang="es-MX" dirty="0" err="1">
+                <a:solidFill>
+                  <a:schemeClr val="bg1"/>
+                </a:solidFill>
+              </a:rPr>
+              <a:t>with</a:t>
+            </a:r>
+            <a:r>
+              <a:rPr lang="es-MX" dirty="0">
+                <a:solidFill>
+                  <a:schemeClr val="bg1"/>
+                </a:solidFill>
+              </a:rPr>
+              <a:t> </a:t>
+            </a:r>
+            <a:r>
+              <a:rPr lang="es-MX" dirty="0" err="1">
+                <a:solidFill>
+                  <a:schemeClr val="bg1"/>
+                </a:solidFill>
+              </a:rPr>
+              <a:t>changes</a:t>
+            </a:r>
+            <a:r>
+              <a:rPr lang="es-MX" dirty="0">
+                <a:solidFill>
+                  <a:schemeClr val="bg1"/>
+                </a:solidFill>
+              </a:rPr>
+              <a:t> in marketing </a:t>
+            </a:r>
+            <a:r>
+              <a:rPr lang="es-MX" dirty="0" err="1">
+                <a:solidFill>
+                  <a:schemeClr val="bg1"/>
+                </a:solidFill>
+              </a:rPr>
+              <a:t>budget</a:t>
+            </a:r>
+            <a:endParaRPr lang="es-MX" dirty="0">
+              <a:solidFill>
+                <a:schemeClr val="bg1"/>
+              </a:solidFill>
+            </a:endParaRPr>
           </a:p>
         </p:txBody>
       </p:sp>
@@ -46689,8 +46939,8 @@
   <p:clrMapOvr>
     <a:masterClrMapping/>
   </p:clrMapOvr>
-  <mc:AlternateContent xmlns:mc="http://schemas.openxmlformats.org/markup-compatibility/2006">
-    <mc:Choice xmlns:p14="http://schemas.microsoft.com/office/powerpoint/2010/main" Requires="p14">
+  <mc:AlternateContent xmlns:mc="http://schemas.openxmlformats.org/markup-compatibility/2006" xmlns:p14="http://schemas.microsoft.com/office/powerpoint/2010/main">
+    <mc:Choice Requires="p14">
       <p:timing>
         <p:tnLst>
           <p:par>
@@ -48146,7 +48396,7 @@
         </p:bldLst>
       </p:timing>
     </mc:Choice>
-    <mc:Fallback>
+    <mc:Fallback xmlns="">
       <p:timing>
         <p:tnLst>
           <p:par>

</xml_diff>